<commit_message>
Updated presentation with info about WebDriverManager library. Updated scripts to use it.
</commit_message>
<xml_diff>
--- a/testing/04_Selenium/Selenium.pptx
+++ b/testing/04_Selenium/Selenium.pptx
@@ -5,10 +5,10 @@
     <p:sldMasterId id="2147483648" r:id="rId1"/>
   </p:sldMasterIdLst>
   <p:notesMasterIdLst>
-    <p:notesMasterId r:id="rId52"/>
+    <p:notesMasterId r:id="rId54"/>
   </p:notesMasterIdLst>
   <p:handoutMasterIdLst>
-    <p:handoutMasterId r:id="rId53"/>
+    <p:handoutMasterId r:id="rId55"/>
   </p:handoutMasterIdLst>
   <p:sldIdLst>
     <p:sldId id="256" r:id="rId2"/>
@@ -59,25 +59,27 @@
     <p:sldId id="313" r:id="rId47"/>
     <p:sldId id="314" r:id="rId48"/>
     <p:sldId id="315" r:id="rId49"/>
-    <p:sldId id="316" r:id="rId50"/>
-    <p:sldId id="317" r:id="rId51"/>
+    <p:sldId id="318" r:id="rId50"/>
+    <p:sldId id="319" r:id="rId51"/>
+    <p:sldId id="316" r:id="rId52"/>
+    <p:sldId id="317" r:id="rId53"/>
   </p:sldIdLst>
   <p:sldSz cx="12192000" cy="6858000"/>
   <p:notesSz cx="6858000" cy="9144000"/>
   <p:embeddedFontLst>
     <p:embeddedFont>
       <p:font typeface="AA Zuehlke" panose="02000503060000020004" pitchFamily="2" charset="0"/>
-      <p:regular r:id="rId54"/>
-      <p:italic r:id="rId55"/>
+      <p:regular r:id="rId56"/>
+      <p:italic r:id="rId57"/>
     </p:embeddedFont>
     <p:embeddedFont>
       <p:font typeface="AA Zuehlke Medium" panose="02000603060000020004" pitchFamily="2" charset="0"/>
-      <p:regular r:id="rId56"/>
-      <p:italic r:id="rId57"/>
+      <p:regular r:id="rId58"/>
+      <p:italic r:id="rId59"/>
     </p:embeddedFont>
   </p:embeddedFontLst>
   <p:custDataLst>
-    <p:tags r:id="rId58"/>
+    <p:tags r:id="rId60"/>
   </p:custDataLst>
   <p:defaultTextStyle>
     <a:defPPr>
@@ -1831,7 +1833,7 @@
               <a:rPr lang="en-GB" smtClean="0">
                 <a:latin typeface="AA Zuehlke" pitchFamily="2" charset="0"/>
               </a:rPr>
-              <a:t>15/08/2018</a:t>
+              <a:t>30/08/2018</a:t>
             </a:fld>
             <a:endParaRPr lang="en-GB">
               <a:latin typeface="AA Zuehlke" pitchFamily="2" charset="0"/>
@@ -2015,7 +2017,7 @@
             <a:fld id="{A6966AE6-B72D-4967-9CA3-8469D2863705}" type="datetimeFigureOut">
               <a:rPr lang="en-GB" noProof="0" smtClean="0"/>
               <a:pPr/>
-              <a:t>15/08/2018</a:t>
+              <a:t>30/08/2018</a:t>
             </a:fld>
             <a:endParaRPr lang="en-GB" noProof="0"/>
           </a:p>
@@ -38279,16 +38281,8 @@
           <a:p>
             <a:pPr marL="0" indent="0"/>
             <a:r>
-              <a:rPr lang="en-GB" dirty="0"/>
-              <a:t>Reports generated from </a:t>
-            </a:r>
-            <a:r>
-              <a:rPr lang="en-GB" dirty="0" err="1"/>
-              <a:t>Surefire</a:t>
-            </a:r>
-            <a:r>
-              <a:rPr lang="en-GB" dirty="0"/>
-              <a:t> plugin</a:t>
+              <a:rPr lang="en-GB" i="1" dirty="0" err="1"/>
+              <a:t>WebDriverManager</a:t>
             </a:r>
             <a:endParaRPr lang="en-GB" i="1" dirty="0"/>
           </a:p>
@@ -38356,18 +38350,22 @@
                   </a:schemeClr>
                 </a:solidFill>
               </a:rPr>
-              <a:t>Once tests are executed using Maven with </a:t>
-            </a:r>
-            <a:r>
-              <a:rPr lang="en-GB" sz="1400" dirty="0" err="1">
+              <a:t>In order to achieve complete robustness of your scripts, there is one more step that need to be performed.</a:t>
+            </a:r>
+          </a:p>
+          <a:p>
+            <a:r>
+              <a:rPr lang="en-GB" sz="1400" dirty="0">
                 <a:solidFill>
                   <a:schemeClr val="accent6">
                     <a:lumMod val="10000"/>
                   </a:schemeClr>
                 </a:solidFill>
               </a:rPr>
-              <a:t>Surefire</a:t>
-            </a:r>
+              <a:t>Remember when we mentioned at the beginning of this presentation that in order to run scripts on specific browser you need to download corresponding driver and set system property to relative path that driver is stored. Bad side of this approach is that these files are quite large and you don’t have enough flexibility since relative path is used in your code.  So when new people pull scripts from repo, they would need to download these files, put in desired folders and change paths in script code.</a:t>
+            </a:r>
+          </a:p>
+          <a:p>
             <a:r>
               <a:rPr lang="en-GB" sz="1400" dirty="0">
                 <a:solidFill>
@@ -38376,7 +38374,200 @@
                   </a:schemeClr>
                 </a:solidFill>
               </a:rPr>
-              <a:t> plugin, execution results are automatically generated. In order for them to be generated at least one of existing TCs included in execution have to fail or to be skipped.</a:t>
+              <a:t>To overcome this drawbacks you should add following dependency in your pom.xml file:</a:t>
+            </a:r>
+          </a:p>
+          <a:p>
+            <a:pPr marL="0" indent="0">
+              <a:buNone/>
+            </a:pPr>
+            <a:r>
+              <a:rPr lang="en-GB" sz="1100" i="1" dirty="0">
+                <a:solidFill>
+                  <a:srgbClr val="7030A0"/>
+                </a:solidFill>
+              </a:rPr>
+              <a:t>&lt;</a:t>
+            </a:r>
+            <a:r>
+              <a:rPr lang="en-GB" sz="1100" i="1" dirty="0" err="1">
+                <a:solidFill>
+                  <a:srgbClr val="7030A0"/>
+                </a:solidFill>
+              </a:rPr>
+              <a:t>depedency</a:t>
+            </a:r>
+            <a:r>
+              <a:rPr lang="en-GB" sz="1100" i="1" dirty="0">
+                <a:solidFill>
+                  <a:srgbClr val="7030A0"/>
+                </a:solidFill>
+              </a:rPr>
+              <a:t>&gt;</a:t>
+            </a:r>
+          </a:p>
+          <a:p>
+            <a:pPr marL="0" indent="0">
+              <a:buNone/>
+            </a:pPr>
+            <a:r>
+              <a:rPr lang="en-GB" sz="1100" i="1" dirty="0">
+                <a:solidFill>
+                  <a:srgbClr val="7030A0"/>
+                </a:solidFill>
+              </a:rPr>
+              <a:t>	&lt;</a:t>
+            </a:r>
+            <a:r>
+              <a:rPr lang="en-GB" sz="1100" i="1" dirty="0" err="1">
+                <a:solidFill>
+                  <a:srgbClr val="7030A0"/>
+                </a:solidFill>
+              </a:rPr>
+              <a:t>groupId</a:t>
+            </a:r>
+            <a:r>
+              <a:rPr lang="en-GB" sz="1100" i="1" dirty="0">
+                <a:solidFill>
+                  <a:srgbClr val="7030A0"/>
+                </a:solidFill>
+              </a:rPr>
+              <a:t>&gt;</a:t>
+            </a:r>
+            <a:r>
+              <a:rPr lang="en-GB" sz="1100" i="1" dirty="0" err="1">
+                <a:solidFill>
+                  <a:srgbClr val="7030A0"/>
+                </a:solidFill>
+              </a:rPr>
+              <a:t>io.github.bonigarcia</a:t>
+            </a:r>
+            <a:r>
+              <a:rPr lang="en-GB" sz="1100" i="1" dirty="0">
+                <a:solidFill>
+                  <a:srgbClr val="7030A0"/>
+                </a:solidFill>
+              </a:rPr>
+              <a:t>&lt;/</a:t>
+            </a:r>
+            <a:r>
+              <a:rPr lang="en-GB" sz="1100" i="1" dirty="0" err="1">
+                <a:solidFill>
+                  <a:srgbClr val="7030A0"/>
+                </a:solidFill>
+              </a:rPr>
+              <a:t>groupId</a:t>
+            </a:r>
+            <a:r>
+              <a:rPr lang="en-GB" sz="1100" i="1" dirty="0">
+                <a:solidFill>
+                  <a:srgbClr val="7030A0"/>
+                </a:solidFill>
+              </a:rPr>
+              <a:t>&gt;</a:t>
+            </a:r>
+          </a:p>
+          <a:p>
+            <a:pPr marL="0" indent="0">
+              <a:buNone/>
+            </a:pPr>
+            <a:r>
+              <a:rPr lang="en-GB" sz="1100" i="1" dirty="0">
+                <a:solidFill>
+                  <a:srgbClr val="7030A0"/>
+                </a:solidFill>
+              </a:rPr>
+              <a:t>	&lt;</a:t>
+            </a:r>
+            <a:r>
+              <a:rPr lang="en-GB" sz="1100" i="1" dirty="0" err="1">
+                <a:solidFill>
+                  <a:srgbClr val="7030A0"/>
+                </a:solidFill>
+              </a:rPr>
+              <a:t>artifactId</a:t>
+            </a:r>
+            <a:r>
+              <a:rPr lang="en-GB" sz="1100" i="1" dirty="0">
+                <a:solidFill>
+                  <a:srgbClr val="7030A0"/>
+                </a:solidFill>
+              </a:rPr>
+              <a:t>&gt;</a:t>
+            </a:r>
+            <a:r>
+              <a:rPr lang="en-GB" sz="1100" i="1" dirty="0" err="1">
+                <a:solidFill>
+                  <a:srgbClr val="7030A0"/>
+                </a:solidFill>
+              </a:rPr>
+              <a:t>webdrivermanager</a:t>
+            </a:r>
+            <a:r>
+              <a:rPr lang="en-GB" sz="1100" i="1" dirty="0">
+                <a:solidFill>
+                  <a:srgbClr val="7030A0"/>
+                </a:solidFill>
+              </a:rPr>
+              <a:t>&lt;/</a:t>
+            </a:r>
+            <a:r>
+              <a:rPr lang="en-GB" sz="1100" i="1" dirty="0" err="1">
+                <a:solidFill>
+                  <a:srgbClr val="7030A0"/>
+                </a:solidFill>
+              </a:rPr>
+              <a:t>artifactId</a:t>
+            </a:r>
+            <a:r>
+              <a:rPr lang="en-GB" sz="1100" i="1" dirty="0">
+                <a:solidFill>
+                  <a:srgbClr val="7030A0"/>
+                </a:solidFill>
+              </a:rPr>
+              <a:t>&gt;</a:t>
+            </a:r>
+          </a:p>
+          <a:p>
+            <a:pPr marL="0" indent="0">
+              <a:buNone/>
+            </a:pPr>
+            <a:r>
+              <a:rPr lang="en-GB" sz="1100" i="1" dirty="0">
+                <a:solidFill>
+                  <a:srgbClr val="7030A0"/>
+                </a:solidFill>
+              </a:rPr>
+              <a:t>	&lt;version&gt;2.2.5&lt;/version&gt;</a:t>
+            </a:r>
+          </a:p>
+          <a:p>
+            <a:pPr marL="0" indent="0">
+              <a:buNone/>
+            </a:pPr>
+            <a:r>
+              <a:rPr lang="en-GB" sz="1100" i="1" dirty="0">
+                <a:solidFill>
+                  <a:srgbClr val="7030A0"/>
+                </a:solidFill>
+              </a:rPr>
+              <a:t>&lt;/</a:t>
+            </a:r>
+            <a:r>
+              <a:rPr lang="en-GB" sz="1100" i="1" dirty="0" err="1">
+                <a:solidFill>
+                  <a:srgbClr val="7030A0"/>
+                </a:solidFill>
+              </a:rPr>
+              <a:t>depedency</a:t>
+            </a:r>
+            <a:r>
+              <a:rPr lang="en-GB" sz="1100" i="1" dirty="0">
+                <a:solidFill>
+                  <a:srgbClr val="7030A0"/>
+                </a:solidFill>
+              </a:rPr>
+              <a:t>&gt;</a:t>
             </a:r>
           </a:p>
           <a:p>
@@ -38388,48 +38579,71 @@
                   </a:schemeClr>
                 </a:solidFill>
               </a:rPr>
-              <a:t>Reports are stored in </a:t>
-            </a:r>
-            <a:r>
-              <a:rPr lang="en-GB" sz="1400" i="1" dirty="0" err="1">
+              <a:t>Library usage: In your </a:t>
+            </a:r>
+            <a:r>
+              <a:rPr lang="en-GB" sz="1400" dirty="0" err="1">
                 <a:solidFill>
                   <a:schemeClr val="accent6">
                     <a:lumMod val="10000"/>
                   </a:schemeClr>
                 </a:solidFill>
               </a:rPr>
-              <a:t>projectName</a:t>
-            </a:r>
-            <a:r>
-              <a:rPr lang="en-GB" sz="1400" i="1" dirty="0">
+              <a:t>BrowserFactory</a:t>
+            </a:r>
+            <a:r>
+              <a:rPr lang="en-GB" sz="1400" dirty="0">
                 <a:solidFill>
                   <a:schemeClr val="accent6">
                     <a:lumMod val="10000"/>
                   </a:schemeClr>
                 </a:solidFill>
               </a:rPr>
-              <a:t>/target/</a:t>
-            </a:r>
-            <a:r>
-              <a:rPr lang="en-GB" sz="1400" i="1" dirty="0" err="1">
+              <a:t> class comment out </a:t>
+            </a:r>
+            <a:r>
+              <a:rPr lang="en-GB" sz="1400" dirty="0" err="1">
                 <a:solidFill>
                   <a:schemeClr val="accent6">
                     <a:lumMod val="10000"/>
                   </a:schemeClr>
                 </a:solidFill>
               </a:rPr>
-              <a:t>surefire</a:t>
-            </a:r>
-            <a:r>
-              <a:rPr lang="en-GB" sz="1400" i="1" dirty="0">
+              <a:t>System.setProperty</a:t>
+            </a:r>
+            <a:r>
+              <a:rPr lang="en-GB" sz="1400" dirty="0">
                 <a:solidFill>
                   <a:schemeClr val="accent6">
                     <a:lumMod val="10000"/>
                   </a:schemeClr>
                 </a:solidFill>
               </a:rPr>
-              <a:t>-reports</a:t>
-            </a:r>
+              <a:t>(“…”, “…”) and instead put following line of code:</a:t>
+            </a:r>
+          </a:p>
+          <a:p>
+            <a:pPr marL="0" indent="0">
+              <a:buNone/>
+            </a:pPr>
+            <a:r>
+              <a:rPr lang="en-GB" sz="1400" i="1" dirty="0" err="1">
+                <a:solidFill>
+                  <a:srgbClr val="7030A0"/>
+                </a:solidFill>
+              </a:rPr>
+              <a:t>WebDriverManager.chromedriver</a:t>
+            </a:r>
+            <a:r>
+              <a:rPr lang="en-GB" sz="1400" i="1" dirty="0">
+                <a:solidFill>
+                  <a:srgbClr val="7030A0"/>
+                </a:solidFill>
+              </a:rPr>
+              <a:t>().setup(); </a:t>
+            </a:r>
+          </a:p>
+          <a:p>
             <a:r>
               <a:rPr lang="en-GB" sz="1400" dirty="0">
                 <a:solidFill>
@@ -38438,79 +38652,11 @@
                   </a:schemeClr>
                 </a:solidFill>
               </a:rPr>
-              <a:t> folder as .html file.</a:t>
-            </a:r>
-          </a:p>
-          <a:p>
-            <a:r>
-              <a:rPr lang="en-GB" sz="1400" dirty="0">
-                <a:solidFill>
-                  <a:schemeClr val="accent6">
-                    <a:lumMod val="10000"/>
-                  </a:schemeClr>
-                </a:solidFill>
-              </a:rPr>
-              <a:t>There are two types of reports generated: index.html and emailable-report.html  </a:t>
-            </a:r>
-          </a:p>
-          <a:p>
-            <a:r>
-              <a:rPr lang="en-GB" sz="1400" i="1" dirty="0">
-                <a:solidFill>
-                  <a:schemeClr val="accent6">
-                    <a:lumMod val="10000"/>
-                  </a:schemeClr>
-                </a:solidFill>
-              </a:rPr>
-              <a:t>index.html </a:t>
-            </a:r>
-            <a:r>
-              <a:rPr lang="en-GB" sz="1400" dirty="0">
-                <a:solidFill>
-                  <a:schemeClr val="accent6">
-                    <a:lumMod val="10000"/>
-                  </a:schemeClr>
-                </a:solidFill>
-              </a:rPr>
-              <a:t>represents quite detailed file that contains number of passed failed and skipped TCs with corresponding error logs and individual methods execution times.</a:t>
-            </a:r>
-          </a:p>
-          <a:p>
-            <a:r>
-              <a:rPr lang="en-GB" sz="1400" i="1" dirty="0">
-                <a:solidFill>
-                  <a:schemeClr val="accent6">
-                    <a:lumMod val="10000"/>
-                  </a:schemeClr>
-                </a:solidFill>
-              </a:rPr>
-              <a:t>emailable-report.html </a:t>
-            </a:r>
-            <a:r>
-              <a:rPr lang="en-GB" sz="1400" dirty="0">
-                <a:solidFill>
-                  <a:schemeClr val="accent6">
-                    <a:lumMod val="10000"/>
-                  </a:schemeClr>
-                </a:solidFill>
-              </a:rPr>
-              <a:t>is report on one page convenient for sending on email to persons of interest.</a:t>
-            </a:r>
-          </a:p>
-          <a:p>
-            <a:r>
-              <a:rPr lang="en-GB" sz="1400" dirty="0">
-                <a:solidFill>
-                  <a:schemeClr val="accent6">
-                    <a:lumMod val="10000"/>
-                  </a:schemeClr>
-                </a:solidFill>
-              </a:rPr>
-              <a:t>See emailable-report.html example on next page.</a:t>
-            </a:r>
-          </a:p>
-          <a:p>
-            <a:endParaRPr lang="en-GB" sz="1400" dirty="0">
+              <a:t>NOTE: There are corresponding methods for every available browser, see screenshot example on next page.</a:t>
+            </a:r>
+          </a:p>
+          <a:p>
+            <a:endParaRPr lang="en-GB" sz="1400" b="1" dirty="0">
               <a:solidFill>
                 <a:schemeClr val="accent6">
                   <a:lumMod val="10000"/>
@@ -38519,6 +38665,123 @@
             </a:endParaRPr>
           </a:p>
           <a:p>
+            <a:pPr marL="0" indent="0">
+              <a:buNone/>
+            </a:pPr>
+            <a:endParaRPr lang="en-GB" sz="1400" dirty="0">
+              <a:solidFill>
+                <a:schemeClr val="accent6">
+                  <a:lumMod val="10000"/>
+                </a:schemeClr>
+              </a:solidFill>
+            </a:endParaRPr>
+          </a:p>
+          <a:p>
+            <a:pPr>
+              <a:buFont typeface="Wingdings" panose="05000000000000000000" pitchFamily="2" charset="2"/>
+              <a:buChar char="§"/>
+            </a:pPr>
+            <a:endParaRPr lang="en-GB" sz="1400" dirty="0">
+              <a:solidFill>
+                <a:schemeClr val="accent6">
+                  <a:lumMod val="10000"/>
+                </a:schemeClr>
+              </a:solidFill>
+            </a:endParaRPr>
+          </a:p>
+          <a:p>
+            <a:pPr>
+              <a:buFont typeface="Wingdings" panose="05000000000000000000" pitchFamily="2" charset="2"/>
+              <a:buChar char="§"/>
+            </a:pPr>
+            <a:endParaRPr lang="en-GB" sz="1400" dirty="0">
+              <a:solidFill>
+                <a:schemeClr val="accent6">
+                  <a:lumMod val="10000"/>
+                </a:schemeClr>
+              </a:solidFill>
+            </a:endParaRPr>
+          </a:p>
+          <a:p>
+            <a:pPr>
+              <a:buFont typeface="Wingdings" panose="05000000000000000000" pitchFamily="2" charset="2"/>
+              <a:buChar char="§"/>
+            </a:pPr>
+            <a:endParaRPr lang="en-GB" sz="1400" dirty="0">
+              <a:solidFill>
+                <a:schemeClr val="accent6">
+                  <a:lumMod val="10000"/>
+                </a:schemeClr>
+              </a:solidFill>
+            </a:endParaRPr>
+          </a:p>
+          <a:p>
+            <a:pPr>
+              <a:buFont typeface="Wingdings" panose="05000000000000000000" pitchFamily="2" charset="2"/>
+              <a:buChar char="§"/>
+            </a:pPr>
+            <a:endParaRPr lang="en-GB" sz="1400" dirty="0">
+              <a:solidFill>
+                <a:schemeClr val="accent6">
+                  <a:lumMod val="10000"/>
+                </a:schemeClr>
+              </a:solidFill>
+            </a:endParaRPr>
+          </a:p>
+          <a:p>
+            <a:pPr>
+              <a:buFont typeface="Wingdings" panose="05000000000000000000" pitchFamily="2" charset="2"/>
+              <a:buChar char="§"/>
+            </a:pPr>
+            <a:endParaRPr lang="en-GB" sz="1400" dirty="0">
+              <a:solidFill>
+                <a:schemeClr val="accent6">
+                  <a:lumMod val="10000"/>
+                </a:schemeClr>
+              </a:solidFill>
+            </a:endParaRPr>
+          </a:p>
+          <a:p>
+            <a:r>
+              <a:rPr lang="en-GB" sz="1400" dirty="0">
+                <a:solidFill>
+                  <a:srgbClr val="000000"/>
+                </a:solidFill>
+              </a:rPr>
+              <a:t>Example of complete </a:t>
+            </a:r>
+            <a:r>
+              <a:rPr lang="en-GB" sz="1400" i="1" dirty="0">
+                <a:solidFill>
+                  <a:srgbClr val="000000"/>
+                </a:solidFill>
+              </a:rPr>
+              <a:t>pom.xml </a:t>
+            </a:r>
+            <a:r>
+              <a:rPr lang="en-GB" sz="1400" dirty="0">
+                <a:solidFill>
+                  <a:srgbClr val="000000"/>
+                </a:solidFill>
+              </a:rPr>
+              <a:t>file can be found on image displayed on next slide.</a:t>
+            </a:r>
+          </a:p>
+          <a:p>
+            <a:pPr marL="0" indent="0">
+              <a:buNone/>
+            </a:pPr>
+            <a:endParaRPr lang="en-GB" sz="1000" dirty="0">
+              <a:solidFill>
+                <a:srgbClr val="000000"/>
+              </a:solidFill>
+            </a:endParaRPr>
+          </a:p>
+          <a:p>
+            <a:pPr>
+              <a:buFont typeface="Wingdings" panose="05000000000000000000" pitchFamily="2" charset="2"/>
+              <a:buChar char="§"/>
+            </a:pPr>
             <a:endParaRPr lang="en-GB" sz="1200" dirty="0">
               <a:solidFill>
                 <a:srgbClr val="7030A0"/>
@@ -38570,7 +38833,7 @@
     </p:spTree>
     <p:extLst>
       <p:ext uri="{BB962C8B-B14F-4D97-AF65-F5344CB8AC3E}">
-        <p14:creationId xmlns:p14="http://schemas.microsoft.com/office/powerpoint/2010/main" val="2786698531"/>
+        <p14:creationId xmlns:p14="http://schemas.microsoft.com/office/powerpoint/2010/main" val="953091684"/>
       </p:ext>
     </p:extLst>
   </p:cSld>
@@ -38786,6 +39049,632 @@
 </file>
 
 <file path=ppt/slides/slide50.xml><?xml version="1.0" encoding="utf-8"?>
+<p:sld xmlns:a="http://schemas.openxmlformats.org/drawingml/2006/main" xmlns:r="http://schemas.openxmlformats.org/officeDocument/2006/relationships" xmlns:p="http://schemas.openxmlformats.org/presentationml/2006/main">
+  <p:cSld>
+    <p:spTree>
+      <p:nvGrpSpPr>
+        <p:cNvPr id="1" name=""/>
+        <p:cNvGrpSpPr/>
+        <p:nvPr/>
+      </p:nvGrpSpPr>
+      <p:grpSpPr>
+        <a:xfrm>
+          <a:off x="0" y="0"/>
+          <a:ext cx="0" cy="0"/>
+          <a:chOff x="0" y="0"/>
+          <a:chExt cx="0" cy="0"/>
+        </a:xfrm>
+      </p:grpSpPr>
+      <p:sp>
+        <p:nvSpPr>
+          <p:cNvPr id="4" name="Text Placeholder 3">
+            <a:extLst>
+              <a:ext uri="{FF2B5EF4-FFF2-40B4-BE49-F238E27FC236}">
+                <a16:creationId xmlns:a16="http://schemas.microsoft.com/office/drawing/2014/main" id="{A82C62F8-4DE2-4C05-BD96-58411F4D455E}"/>
+              </a:ext>
+            </a:extLst>
+          </p:cNvPr>
+          <p:cNvSpPr>
+            <a:spLocks noGrp="1"/>
+          </p:cNvSpPr>
+          <p:nvPr>
+            <p:ph type="body" sz="quarter" idx="13"/>
+          </p:nvPr>
+        </p:nvSpPr>
+        <p:spPr/>
+        <p:txBody>
+          <a:bodyPr/>
+          <a:lstStyle/>
+          <a:p>
+            <a:pPr marL="0" indent="0"/>
+            <a:r>
+              <a:rPr lang="en-GB" i="1" dirty="0" err="1"/>
+              <a:t>WebDriverManager</a:t>
+            </a:r>
+            <a:endParaRPr lang="en-GB" i="1" dirty="0"/>
+          </a:p>
+        </p:txBody>
+      </p:sp>
+      <p:sp>
+        <p:nvSpPr>
+          <p:cNvPr id="3" name="Title 2">
+            <a:extLst>
+              <a:ext uri="{FF2B5EF4-FFF2-40B4-BE49-F238E27FC236}">
+                <a16:creationId xmlns:a16="http://schemas.microsoft.com/office/drawing/2014/main" id="{CCD6E443-533C-4F46-9316-BD5FBD3020CA}"/>
+              </a:ext>
+            </a:extLst>
+          </p:cNvPr>
+          <p:cNvSpPr>
+            <a:spLocks noGrp="1"/>
+          </p:cNvSpPr>
+          <p:nvPr>
+            <p:ph type="title"/>
+          </p:nvPr>
+        </p:nvSpPr>
+        <p:spPr/>
+        <p:txBody>
+          <a:bodyPr/>
+          <a:lstStyle/>
+          <a:p>
+            <a:r>
+              <a:rPr lang="en-GB" dirty="0"/>
+              <a:t>Selenium</a:t>
+            </a:r>
+          </a:p>
+        </p:txBody>
+      </p:sp>
+      <p:sp>
+        <p:nvSpPr>
+          <p:cNvPr id="5" name="Content Placeholder 4">
+            <a:extLst>
+              <a:ext uri="{FF2B5EF4-FFF2-40B4-BE49-F238E27FC236}">
+                <a16:creationId xmlns:a16="http://schemas.microsoft.com/office/drawing/2014/main" id="{5D6395D8-4E29-4B2C-88B1-D4EBF4E72011}"/>
+              </a:ext>
+            </a:extLst>
+          </p:cNvPr>
+          <p:cNvSpPr>
+            <a:spLocks noGrp="1"/>
+          </p:cNvSpPr>
+          <p:nvPr>
+            <p:ph sz="quarter" idx="14"/>
+          </p:nvPr>
+        </p:nvSpPr>
+        <p:spPr>
+          <a:xfrm>
+            <a:off x="406397" y="1789353"/>
+            <a:ext cx="11379200" cy="4662246"/>
+          </a:xfrm>
+        </p:spPr>
+        <p:txBody>
+          <a:bodyPr/>
+          <a:lstStyle/>
+          <a:p>
+            <a:endParaRPr lang="en-GB" sz="1400" b="1" dirty="0">
+              <a:solidFill>
+                <a:schemeClr val="accent6">
+                  <a:lumMod val="10000"/>
+                </a:schemeClr>
+              </a:solidFill>
+            </a:endParaRPr>
+          </a:p>
+          <a:p>
+            <a:pPr marL="0" indent="0">
+              <a:buNone/>
+            </a:pPr>
+            <a:endParaRPr lang="en-GB" sz="1400" dirty="0">
+              <a:solidFill>
+                <a:schemeClr val="accent6">
+                  <a:lumMod val="10000"/>
+                </a:schemeClr>
+              </a:solidFill>
+            </a:endParaRPr>
+          </a:p>
+          <a:p>
+            <a:pPr>
+              <a:buFont typeface="Wingdings" panose="05000000000000000000" pitchFamily="2" charset="2"/>
+              <a:buChar char="§"/>
+            </a:pPr>
+            <a:endParaRPr lang="en-GB" sz="1400" dirty="0">
+              <a:solidFill>
+                <a:schemeClr val="accent6">
+                  <a:lumMod val="10000"/>
+                </a:schemeClr>
+              </a:solidFill>
+            </a:endParaRPr>
+          </a:p>
+          <a:p>
+            <a:pPr>
+              <a:buFont typeface="Wingdings" panose="05000000000000000000" pitchFamily="2" charset="2"/>
+              <a:buChar char="§"/>
+            </a:pPr>
+            <a:endParaRPr lang="en-GB" sz="1400" dirty="0">
+              <a:solidFill>
+                <a:schemeClr val="accent6">
+                  <a:lumMod val="10000"/>
+                </a:schemeClr>
+              </a:solidFill>
+            </a:endParaRPr>
+          </a:p>
+          <a:p>
+            <a:pPr>
+              <a:buFont typeface="Wingdings" panose="05000000000000000000" pitchFamily="2" charset="2"/>
+              <a:buChar char="§"/>
+            </a:pPr>
+            <a:endParaRPr lang="en-GB" sz="1400" dirty="0">
+              <a:solidFill>
+                <a:schemeClr val="accent6">
+                  <a:lumMod val="10000"/>
+                </a:schemeClr>
+              </a:solidFill>
+            </a:endParaRPr>
+          </a:p>
+          <a:p>
+            <a:pPr>
+              <a:buFont typeface="Wingdings" panose="05000000000000000000" pitchFamily="2" charset="2"/>
+              <a:buChar char="§"/>
+            </a:pPr>
+            <a:endParaRPr lang="en-GB" sz="1400" dirty="0">
+              <a:solidFill>
+                <a:schemeClr val="accent6">
+                  <a:lumMod val="10000"/>
+                </a:schemeClr>
+              </a:solidFill>
+            </a:endParaRPr>
+          </a:p>
+          <a:p>
+            <a:pPr marL="0" indent="0">
+              <a:buNone/>
+            </a:pPr>
+            <a:endParaRPr lang="en-GB" sz="1000" dirty="0">
+              <a:solidFill>
+                <a:srgbClr val="000000"/>
+              </a:solidFill>
+            </a:endParaRPr>
+          </a:p>
+          <a:p>
+            <a:pPr>
+              <a:buFont typeface="Wingdings" panose="05000000000000000000" pitchFamily="2" charset="2"/>
+              <a:buChar char="§"/>
+            </a:pPr>
+            <a:endParaRPr lang="en-GB" sz="1200" dirty="0">
+              <a:solidFill>
+                <a:srgbClr val="7030A0"/>
+              </a:solidFill>
+            </a:endParaRPr>
+          </a:p>
+          <a:p>
+            <a:pPr>
+              <a:buFont typeface="Wingdings" panose="05000000000000000000" pitchFamily="2" charset="2"/>
+              <a:buChar char="§"/>
+            </a:pPr>
+            <a:endParaRPr lang="en-GB" sz="1200" b="1" dirty="0"/>
+          </a:p>
+          <a:p>
+            <a:pPr>
+              <a:buFont typeface="Wingdings" panose="05000000000000000000" pitchFamily="2" charset="2"/>
+              <a:buChar char="§"/>
+            </a:pPr>
+            <a:endParaRPr lang="en-GB" sz="1200" dirty="0"/>
+          </a:p>
+          <a:p>
+            <a:pPr marL="0" indent="0">
+              <a:buNone/>
+            </a:pPr>
+            <a:endParaRPr lang="en-GB" sz="1200" dirty="0"/>
+          </a:p>
+          <a:p>
+            <a:pPr marL="0" indent="0">
+              <a:buNone/>
+            </a:pPr>
+            <a:endParaRPr lang="en-GB" sz="1200" dirty="0"/>
+          </a:p>
+          <a:p>
+            <a:pPr>
+              <a:buFont typeface="Wingdings" panose="05000000000000000000" pitchFamily="2" charset="2"/>
+              <a:buChar char="§"/>
+            </a:pPr>
+            <a:endParaRPr lang="en-GB" sz="1800" dirty="0"/>
+          </a:p>
+          <a:p>
+            <a:pPr>
+              <a:buFont typeface="Wingdings" panose="05000000000000000000" pitchFamily="2" charset="2"/>
+              <a:buChar char="§"/>
+            </a:pPr>
+            <a:endParaRPr lang="en-GB" sz="1800" dirty="0"/>
+          </a:p>
+        </p:txBody>
+      </p:sp>
+      <p:pic>
+        <p:nvPicPr>
+          <p:cNvPr id="6" name="Picture 5">
+            <a:extLst>
+              <a:ext uri="{FF2B5EF4-FFF2-40B4-BE49-F238E27FC236}">
+                <a16:creationId xmlns:a16="http://schemas.microsoft.com/office/drawing/2014/main" id="{C20A4FCC-84FA-4766-A528-E7668AAA51BF}"/>
+              </a:ext>
+            </a:extLst>
+          </p:cNvPr>
+          <p:cNvPicPr>
+            <a:picLocks noChangeAspect="1"/>
+          </p:cNvPicPr>
+          <p:nvPr/>
+        </p:nvPicPr>
+        <p:blipFill>
+          <a:blip r:embed="rId2">
+            <a:extLst>
+              <a:ext uri="{28A0092B-C50C-407E-A947-70E740481C1C}">
+                <a14:useLocalDpi xmlns:a14="http://schemas.microsoft.com/office/drawing/2010/main" val="0"/>
+              </a:ext>
+            </a:extLst>
+          </a:blip>
+          <a:stretch>
+            <a:fillRect/>
+          </a:stretch>
+        </p:blipFill>
+        <p:spPr>
+          <a:xfrm>
+            <a:off x="3400046" y="1710314"/>
+            <a:ext cx="5391902" cy="4820323"/>
+          </a:xfrm>
+          <a:prstGeom prst="rect">
+            <a:avLst/>
+          </a:prstGeom>
+        </p:spPr>
+      </p:pic>
+    </p:spTree>
+    <p:extLst>
+      <p:ext uri="{BB962C8B-B14F-4D97-AF65-F5344CB8AC3E}">
+        <p14:creationId xmlns:p14="http://schemas.microsoft.com/office/powerpoint/2010/main" val="3269993436"/>
+      </p:ext>
+    </p:extLst>
+  </p:cSld>
+  <p:clrMapOvr>
+    <a:masterClrMapping/>
+  </p:clrMapOvr>
+</p:sld>
+</file>
+
+<file path=ppt/slides/slide51.xml><?xml version="1.0" encoding="utf-8"?>
+<p:sld xmlns:a="http://schemas.openxmlformats.org/drawingml/2006/main" xmlns:r="http://schemas.openxmlformats.org/officeDocument/2006/relationships" xmlns:p="http://schemas.openxmlformats.org/presentationml/2006/main">
+  <p:cSld>
+    <p:spTree>
+      <p:nvGrpSpPr>
+        <p:cNvPr id="1" name=""/>
+        <p:cNvGrpSpPr/>
+        <p:nvPr/>
+      </p:nvGrpSpPr>
+      <p:grpSpPr>
+        <a:xfrm>
+          <a:off x="0" y="0"/>
+          <a:ext cx="0" cy="0"/>
+          <a:chOff x="0" y="0"/>
+          <a:chExt cx="0" cy="0"/>
+        </a:xfrm>
+      </p:grpSpPr>
+      <p:sp>
+        <p:nvSpPr>
+          <p:cNvPr id="4" name="Text Placeholder 3">
+            <a:extLst>
+              <a:ext uri="{FF2B5EF4-FFF2-40B4-BE49-F238E27FC236}">
+                <a16:creationId xmlns:a16="http://schemas.microsoft.com/office/drawing/2014/main" id="{A82C62F8-4DE2-4C05-BD96-58411F4D455E}"/>
+              </a:ext>
+            </a:extLst>
+          </p:cNvPr>
+          <p:cNvSpPr>
+            <a:spLocks noGrp="1"/>
+          </p:cNvSpPr>
+          <p:nvPr>
+            <p:ph type="body" sz="quarter" idx="13"/>
+          </p:nvPr>
+        </p:nvSpPr>
+        <p:spPr/>
+        <p:txBody>
+          <a:bodyPr/>
+          <a:lstStyle/>
+          <a:p>
+            <a:pPr marL="0" indent="0"/>
+            <a:r>
+              <a:rPr lang="en-GB" dirty="0"/>
+              <a:t>Reports generated from </a:t>
+            </a:r>
+            <a:r>
+              <a:rPr lang="en-GB" dirty="0" err="1"/>
+              <a:t>Surefire</a:t>
+            </a:r>
+            <a:r>
+              <a:rPr lang="en-GB" dirty="0"/>
+              <a:t> plugin</a:t>
+            </a:r>
+            <a:endParaRPr lang="en-GB" i="1" dirty="0"/>
+          </a:p>
+        </p:txBody>
+      </p:sp>
+      <p:sp>
+        <p:nvSpPr>
+          <p:cNvPr id="3" name="Title 2">
+            <a:extLst>
+              <a:ext uri="{FF2B5EF4-FFF2-40B4-BE49-F238E27FC236}">
+                <a16:creationId xmlns:a16="http://schemas.microsoft.com/office/drawing/2014/main" id="{CCD6E443-533C-4F46-9316-BD5FBD3020CA}"/>
+              </a:ext>
+            </a:extLst>
+          </p:cNvPr>
+          <p:cNvSpPr>
+            <a:spLocks noGrp="1"/>
+          </p:cNvSpPr>
+          <p:nvPr>
+            <p:ph type="title"/>
+          </p:nvPr>
+        </p:nvSpPr>
+        <p:spPr/>
+        <p:txBody>
+          <a:bodyPr/>
+          <a:lstStyle/>
+          <a:p>
+            <a:r>
+              <a:rPr lang="en-GB" dirty="0"/>
+              <a:t>Selenium</a:t>
+            </a:r>
+          </a:p>
+        </p:txBody>
+      </p:sp>
+      <p:sp>
+        <p:nvSpPr>
+          <p:cNvPr id="5" name="Content Placeholder 4">
+            <a:extLst>
+              <a:ext uri="{FF2B5EF4-FFF2-40B4-BE49-F238E27FC236}">
+                <a16:creationId xmlns:a16="http://schemas.microsoft.com/office/drawing/2014/main" id="{5D6395D8-4E29-4B2C-88B1-D4EBF4E72011}"/>
+              </a:ext>
+            </a:extLst>
+          </p:cNvPr>
+          <p:cNvSpPr>
+            <a:spLocks noGrp="1"/>
+          </p:cNvSpPr>
+          <p:nvPr>
+            <p:ph sz="quarter" idx="14"/>
+          </p:nvPr>
+        </p:nvSpPr>
+        <p:spPr>
+          <a:xfrm>
+            <a:off x="406397" y="1789353"/>
+            <a:ext cx="11379200" cy="4662246"/>
+          </a:xfrm>
+        </p:spPr>
+        <p:txBody>
+          <a:bodyPr/>
+          <a:lstStyle/>
+          <a:p>
+            <a:r>
+              <a:rPr lang="en-GB" sz="1400" dirty="0">
+                <a:solidFill>
+                  <a:schemeClr val="accent6">
+                    <a:lumMod val="10000"/>
+                  </a:schemeClr>
+                </a:solidFill>
+              </a:rPr>
+              <a:t>Once tests are executed using Maven with </a:t>
+            </a:r>
+            <a:r>
+              <a:rPr lang="en-GB" sz="1400" dirty="0" err="1">
+                <a:solidFill>
+                  <a:schemeClr val="accent6">
+                    <a:lumMod val="10000"/>
+                  </a:schemeClr>
+                </a:solidFill>
+              </a:rPr>
+              <a:t>Surefire</a:t>
+            </a:r>
+            <a:r>
+              <a:rPr lang="en-GB" sz="1400" dirty="0">
+                <a:solidFill>
+                  <a:schemeClr val="accent6">
+                    <a:lumMod val="10000"/>
+                  </a:schemeClr>
+                </a:solidFill>
+              </a:rPr>
+              <a:t> plugin, execution results are automatically generated. In order for them to be generated at least one of existing TCs included in execution have to fail or to be skipped.</a:t>
+            </a:r>
+          </a:p>
+          <a:p>
+            <a:r>
+              <a:rPr lang="en-GB" sz="1400" dirty="0">
+                <a:solidFill>
+                  <a:schemeClr val="accent6">
+                    <a:lumMod val="10000"/>
+                  </a:schemeClr>
+                </a:solidFill>
+              </a:rPr>
+              <a:t>Reports are stored in </a:t>
+            </a:r>
+            <a:r>
+              <a:rPr lang="en-GB" sz="1400" i="1" dirty="0" err="1">
+                <a:solidFill>
+                  <a:schemeClr val="accent6">
+                    <a:lumMod val="10000"/>
+                  </a:schemeClr>
+                </a:solidFill>
+              </a:rPr>
+              <a:t>projectName</a:t>
+            </a:r>
+            <a:r>
+              <a:rPr lang="en-GB" sz="1400" i="1" dirty="0">
+                <a:solidFill>
+                  <a:schemeClr val="accent6">
+                    <a:lumMod val="10000"/>
+                  </a:schemeClr>
+                </a:solidFill>
+              </a:rPr>
+              <a:t>/target/</a:t>
+            </a:r>
+            <a:r>
+              <a:rPr lang="en-GB" sz="1400" i="1" dirty="0" err="1">
+                <a:solidFill>
+                  <a:schemeClr val="accent6">
+                    <a:lumMod val="10000"/>
+                  </a:schemeClr>
+                </a:solidFill>
+              </a:rPr>
+              <a:t>surefire</a:t>
+            </a:r>
+            <a:r>
+              <a:rPr lang="en-GB" sz="1400" i="1" dirty="0">
+                <a:solidFill>
+                  <a:schemeClr val="accent6">
+                    <a:lumMod val="10000"/>
+                  </a:schemeClr>
+                </a:solidFill>
+              </a:rPr>
+              <a:t>-reports</a:t>
+            </a:r>
+            <a:r>
+              <a:rPr lang="en-GB" sz="1400" dirty="0">
+                <a:solidFill>
+                  <a:schemeClr val="accent6">
+                    <a:lumMod val="10000"/>
+                  </a:schemeClr>
+                </a:solidFill>
+              </a:rPr>
+              <a:t> folder as .html file.</a:t>
+            </a:r>
+          </a:p>
+          <a:p>
+            <a:r>
+              <a:rPr lang="en-GB" sz="1400" dirty="0">
+                <a:solidFill>
+                  <a:schemeClr val="accent6">
+                    <a:lumMod val="10000"/>
+                  </a:schemeClr>
+                </a:solidFill>
+              </a:rPr>
+              <a:t>There are two types of reports generated: index.html and emailable-report.html  </a:t>
+            </a:r>
+          </a:p>
+          <a:p>
+            <a:r>
+              <a:rPr lang="en-GB" sz="1400" i="1" dirty="0">
+                <a:solidFill>
+                  <a:schemeClr val="accent6">
+                    <a:lumMod val="10000"/>
+                  </a:schemeClr>
+                </a:solidFill>
+              </a:rPr>
+              <a:t>index.html </a:t>
+            </a:r>
+            <a:r>
+              <a:rPr lang="en-GB" sz="1400" dirty="0">
+                <a:solidFill>
+                  <a:schemeClr val="accent6">
+                    <a:lumMod val="10000"/>
+                  </a:schemeClr>
+                </a:solidFill>
+              </a:rPr>
+              <a:t>represents quite detailed file that contains number of passed failed and skipped TCs with corresponding error logs and individual methods execution times.</a:t>
+            </a:r>
+          </a:p>
+          <a:p>
+            <a:r>
+              <a:rPr lang="en-GB" sz="1400" i="1" dirty="0">
+                <a:solidFill>
+                  <a:schemeClr val="accent6">
+                    <a:lumMod val="10000"/>
+                  </a:schemeClr>
+                </a:solidFill>
+              </a:rPr>
+              <a:t>emailable-report.html </a:t>
+            </a:r>
+            <a:r>
+              <a:rPr lang="en-GB" sz="1400" dirty="0">
+                <a:solidFill>
+                  <a:schemeClr val="accent6">
+                    <a:lumMod val="10000"/>
+                  </a:schemeClr>
+                </a:solidFill>
+              </a:rPr>
+              <a:t>is report on one page convenient for sending on email to persons of interest.</a:t>
+            </a:r>
+          </a:p>
+          <a:p>
+            <a:r>
+              <a:rPr lang="en-GB" sz="1400" dirty="0">
+                <a:solidFill>
+                  <a:schemeClr val="accent6">
+                    <a:lumMod val="10000"/>
+                  </a:schemeClr>
+                </a:solidFill>
+              </a:rPr>
+              <a:t>See emailable-report.html example on next page.</a:t>
+            </a:r>
+          </a:p>
+          <a:p>
+            <a:endParaRPr lang="en-GB" sz="1400" dirty="0">
+              <a:solidFill>
+                <a:schemeClr val="accent6">
+                  <a:lumMod val="10000"/>
+                </a:schemeClr>
+              </a:solidFill>
+            </a:endParaRPr>
+          </a:p>
+          <a:p>
+            <a:endParaRPr lang="en-GB" sz="1200" dirty="0">
+              <a:solidFill>
+                <a:srgbClr val="7030A0"/>
+              </a:solidFill>
+            </a:endParaRPr>
+          </a:p>
+          <a:p>
+            <a:pPr>
+              <a:buFont typeface="Wingdings" panose="05000000000000000000" pitchFamily="2" charset="2"/>
+              <a:buChar char="§"/>
+            </a:pPr>
+            <a:endParaRPr lang="en-GB" sz="1200" b="1" dirty="0"/>
+          </a:p>
+          <a:p>
+            <a:pPr>
+              <a:buFont typeface="Wingdings" panose="05000000000000000000" pitchFamily="2" charset="2"/>
+              <a:buChar char="§"/>
+            </a:pPr>
+            <a:endParaRPr lang="en-GB" sz="1200" dirty="0"/>
+          </a:p>
+          <a:p>
+            <a:pPr marL="0" indent="0">
+              <a:buNone/>
+            </a:pPr>
+            <a:endParaRPr lang="en-GB" sz="1200" dirty="0"/>
+          </a:p>
+          <a:p>
+            <a:pPr marL="0" indent="0">
+              <a:buNone/>
+            </a:pPr>
+            <a:endParaRPr lang="en-GB" sz="1200" dirty="0"/>
+          </a:p>
+          <a:p>
+            <a:pPr>
+              <a:buFont typeface="Wingdings" panose="05000000000000000000" pitchFamily="2" charset="2"/>
+              <a:buChar char="§"/>
+            </a:pPr>
+            <a:endParaRPr lang="en-GB" sz="1800" dirty="0"/>
+          </a:p>
+          <a:p>
+            <a:pPr>
+              <a:buFont typeface="Wingdings" panose="05000000000000000000" pitchFamily="2" charset="2"/>
+              <a:buChar char="§"/>
+            </a:pPr>
+            <a:endParaRPr lang="en-GB" sz="1800" dirty="0"/>
+          </a:p>
+        </p:txBody>
+      </p:sp>
+    </p:spTree>
+    <p:extLst>
+      <p:ext uri="{BB962C8B-B14F-4D97-AF65-F5344CB8AC3E}">
+        <p14:creationId xmlns:p14="http://schemas.microsoft.com/office/powerpoint/2010/main" val="2786698531"/>
+      </p:ext>
+    </p:extLst>
+  </p:cSld>
+  <p:clrMapOvr>
+    <a:masterClrMapping/>
+  </p:clrMapOvr>
+</p:sld>
+</file>
+
+<file path=ppt/slides/slide52.xml><?xml version="1.0" encoding="utf-8"?>
 <p:sld xmlns:a="http://schemas.openxmlformats.org/drawingml/2006/main" xmlns:r="http://schemas.openxmlformats.org/officeDocument/2006/relationships" xmlns:p="http://schemas.openxmlformats.org/presentationml/2006/main">
   <p:cSld>
     <p:spTree>

</xml_diff>